<commit_message>
updated modelTraining.py parameters added ProcessingResults.py file to present graphs at the end of a run
</commit_message>
<xml_diff>
--- a/Genomic data classification - Roei and Bar.pptx
+++ b/Genomic data classification - Roei and Bar.pptx
@@ -1782,7 +1782,7 @@
           <a:p>
             <a:fld id="{8F72BA41-EC5B-4197-BCC8-0FD2E523CD7A}" type="datetimeFigureOut">
               <a:rPr lang="en-US" smtClean="0"/>
-              <a:t>6/25/2023</a:t>
+              <a:t>8/10/2023</a:t>
             </a:fld>
             <a:endParaRPr lang="en-US"/>
           </a:p>
@@ -1985,7 +1985,7 @@
           <a:p>
             <a:fld id="{8F72BA41-EC5B-4197-BCC8-0FD2E523CD7A}" type="datetimeFigureOut">
               <a:rPr lang="en-US" smtClean="0"/>
-              <a:t>6/25/2023</a:t>
+              <a:t>8/10/2023</a:t>
             </a:fld>
             <a:endParaRPr lang="en-US"/>
           </a:p>
@@ -3706,7 +3706,7 @@
           <a:p>
             <a:fld id="{8F72BA41-EC5B-4197-BCC8-0FD2E523CD7A}" type="datetimeFigureOut">
               <a:rPr lang="en-US" smtClean="0"/>
-              <a:t>6/25/2023</a:t>
+              <a:t>8/10/2023</a:t>
             </a:fld>
             <a:endParaRPr lang="en-US"/>
           </a:p>
@@ -3905,7 +3905,7 @@
           <a:p>
             <a:fld id="{8F72BA41-EC5B-4197-BCC8-0FD2E523CD7A}" type="datetimeFigureOut">
               <a:rPr lang="en-US" smtClean="0"/>
-              <a:t>6/25/2023</a:t>
+              <a:t>8/10/2023</a:t>
             </a:fld>
             <a:endParaRPr lang="en-US"/>
           </a:p>
@@ -5695,7 +5695,7 @@
           <a:p>
             <a:fld id="{8F72BA41-EC5B-4197-BCC8-0FD2E523CD7A}" type="datetimeFigureOut">
               <a:rPr lang="en-US" smtClean="0"/>
-              <a:t>6/25/2023</a:t>
+              <a:t>8/10/2023</a:t>
             </a:fld>
             <a:endParaRPr lang="en-US"/>
           </a:p>
@@ -5968,7 +5968,7 @@
           <a:p>
             <a:fld id="{8F72BA41-EC5B-4197-BCC8-0FD2E523CD7A}" type="datetimeFigureOut">
               <a:rPr lang="en-US" smtClean="0"/>
-              <a:t>6/25/2023</a:t>
+              <a:t>8/10/2023</a:t>
             </a:fld>
             <a:endParaRPr lang="en-US"/>
           </a:p>
@@ -6388,7 +6388,7 @@
           <a:p>
             <a:fld id="{8F72BA41-EC5B-4197-BCC8-0FD2E523CD7A}" type="datetimeFigureOut">
               <a:rPr lang="en-US" smtClean="0"/>
-              <a:t>6/25/2023</a:t>
+              <a:t>8/10/2023</a:t>
             </a:fld>
             <a:endParaRPr lang="en-US"/>
           </a:p>
@@ -6544,7 +6544,7 @@
           <a:p>
             <a:fld id="{8F72BA41-EC5B-4197-BCC8-0FD2E523CD7A}" type="datetimeFigureOut">
               <a:rPr lang="en-US" smtClean="0"/>
-              <a:t>6/25/2023</a:t>
+              <a:t>8/10/2023</a:t>
             </a:fld>
             <a:endParaRPr lang="en-US"/>
           </a:p>
@@ -8112,7 +8112,7 @@
           <a:p>
             <a:fld id="{8F72BA41-EC5B-4197-BCC8-0FD2E523CD7A}" type="datetimeFigureOut">
               <a:rPr lang="en-US" smtClean="0"/>
-              <a:t>6/25/2023</a:t>
+              <a:t>8/10/2023</a:t>
             </a:fld>
             <a:endParaRPr lang="en-US"/>
           </a:p>
@@ -9963,7 +9963,7 @@
           <a:p>
             <a:fld id="{8F72BA41-EC5B-4197-BCC8-0FD2E523CD7A}" type="datetimeFigureOut">
               <a:rPr lang="en-US" smtClean="0"/>
-              <a:t>6/25/2023</a:t>
+              <a:t>8/10/2023</a:t>
             </a:fld>
             <a:endParaRPr lang="en-US"/>
           </a:p>
@@ -11776,7 +11776,7 @@
           <a:p>
             <a:fld id="{8F72BA41-EC5B-4197-BCC8-0FD2E523CD7A}" type="datetimeFigureOut">
               <a:rPr lang="en-US" smtClean="0"/>
-              <a:t>6/25/2023</a:t>
+              <a:t>8/10/2023</a:t>
             </a:fld>
             <a:endParaRPr lang="en-US"/>
           </a:p>
@@ -13470,7 +13470,7 @@
             <a:fld id="{8F72BA41-EC5B-4197-BCC8-0FD2E523CD7A}" type="datetimeFigureOut">
               <a:rPr lang="en-US" smtClean="0"/>
               <a:pPr/>
-              <a:t>6/25/2023</a:t>
+              <a:t>8/10/2023</a:t>
             </a:fld>
             <a:endParaRPr lang="en-US" dirty="0"/>
           </a:p>
@@ -18238,7 +18238,15 @@
             </a:pPr>
             <a:r>
               <a:rPr lang="en-US" sz="1500" dirty="0"/>
-              <a:t>The model has four layers in each layer we go through: convolution, activation and pooling.</a:t>
+              <a:t>The model has five layers in each layer we go through: </a:t>
+            </a:r>
+            <a:r>
+              <a:rPr lang="en-US" sz="1500" dirty="0" err="1"/>
+              <a:t>convolution,batch</a:t>
+            </a:r>
+            <a:r>
+              <a:rPr lang="en-US" sz="1500" dirty="0"/>
+              <a:t> normalization, activation and pooling.</a:t>
             </a:r>
             <a:br>
               <a:rPr lang="en-US" sz="1500" dirty="0"/>
@@ -20477,7 +20485,7 @@
             </a:br>
             <a:r>
               <a:rPr lang="en-US" sz="1600" dirty="0"/>
-              <a:t>In addition, the Adam optimizer is employed to update the model parameters during training with a learning rate of 0.001.</a:t>
+              <a:t>In addition, the Adam optimizer is employed to update the model parameters during training with a learning rate of 0.00001.</a:t>
             </a:r>
           </a:p>
           <a:p>
@@ -20488,7 +20496,7 @@
             </a:pPr>
             <a:r>
               <a:rPr lang="en-US" sz="1600" dirty="0"/>
-              <a:t>The training is performed for a fixed number of epochs (30 in our case), with each epoch iterating over the entire training dataset in mini-batches.</a:t>
+              <a:t>The training is performed for a fixed number of epochs (75 in our case), with each epoch iterating over the entire training dataset in mini-batches.</a:t>
             </a:r>
             <a:br>
               <a:rPr lang="en-US" sz="1600" dirty="0"/>
@@ -22465,7 +22473,7 @@
         </p:nvSpPr>
         <p:spPr>
           <a:xfrm>
-            <a:off x="9832" y="1430748"/>
+            <a:off x="16613" y="1344890"/>
             <a:ext cx="5660814" cy="5427252"/>
           </a:xfrm>
         </p:spPr>
@@ -22481,255 +22489,12 @@
               </a:lnSpc>
             </a:pPr>
             <a:r>
-              <a:rPr lang="en-US" sz="1400"/>
-              <a:t>We randomly selected 5,000 data files of pathogens belonging to 10 different classes as inputs.</a:t>
-            </a:r>
-            <a:endParaRPr lang="en-US" sz="1400" dirty="0"/>
-          </a:p>
-          <a:p>
-            <a:pPr>
-              <a:lnSpc>
-                <a:spcPct val="100000"/>
-              </a:lnSpc>
-            </a:pPr>
-            <a:r>
               <a:rPr lang="en-US" sz="1400" dirty="0"/>
-              <a:t>After training our model on the training data set, we got to a pretty good accuracy on training and we saw that class precisions were starting to shape up a bit better than previous test models, we calculated test accuracy and got up to 83% acc for the model. </a:t>
-            </a:r>
-          </a:p>
-          <a:p>
-            <a:pPr>
-              <a:lnSpc>
-                <a:spcPct val="100000"/>
-              </a:lnSpc>
-            </a:pPr>
-            <a:r>
-              <a:rPr lang="en-US" sz="1400" dirty="0"/>
-              <a:t>We printed a confusion matrix in the form of a heat map  showing us what weak spots and what strong spots our model has,</a:t>
-            </a:r>
-          </a:p>
-          <a:p>
-            <a:pPr>
-              <a:lnSpc>
-                <a:spcPct val="100000"/>
-              </a:lnSpc>
-            </a:pPr>
-            <a:r>
-              <a:rPr lang="en-US" sz="1400" dirty="0"/>
-              <a:t>We calculated the ROC and the precision-recall graphs to each class in the model to see if some classes are more problematic than other.</a:t>
-            </a:r>
-          </a:p>
-          <a:p>
-            <a:pPr>
-              <a:lnSpc>
-                <a:spcPct val="100000"/>
-              </a:lnSpc>
-            </a:pPr>
-            <a:r>
-              <a:rPr lang="en-US" sz="1400" dirty="0"/>
-              <a:t>Lastly, we added a learning curve graph to show the number of iterations it took to reach saturation with the model. </a:t>
-            </a:r>
-          </a:p>
-          <a:p>
-            <a:pPr>
-              <a:lnSpc>
-                <a:spcPct val="100000"/>
-              </a:lnSpc>
-            </a:pPr>
-            <a:r>
-              <a:rPr lang="en-US" sz="1400" dirty="0"/>
-              <a:t>In the continue, we will run the model on larger dataset with more classes and try to improve the dataset further in different ways (for example, by performing additional preprocessing operations).</a:t>
-            </a:r>
-          </a:p>
-          <a:p>
-            <a:pPr>
-              <a:lnSpc>
-                <a:spcPct val="100000"/>
-              </a:lnSpc>
-            </a:pPr>
-            <a:r>
-              <a:rPr lang="en-US" sz="1400" dirty="0"/>
-              <a:t>In the future, we will try to integrate the algorithm with a hardware accelerator, and research the results and the performances.</a:t>
+              <a:t>We randomly selected 250 sequences files of each pathogens belonging to 100 different classes as inputs (totaling to 25000 samples).</a:t>
             </a:r>
           </a:p>
         </p:txBody>
       </p:sp>
-      <p:pic>
-        <p:nvPicPr>
-          <p:cNvPr id="9" name="תמונה 8" descr="תמונה שמכילה טקסט, צילום מסך, תפריט&#10;&#10;התיאור נוצר באופן אוטומטי">
-            <a:extLst>
-              <a:ext uri="{FF2B5EF4-FFF2-40B4-BE49-F238E27FC236}">
-                <a16:creationId xmlns:a16="http://schemas.microsoft.com/office/drawing/2014/main" id="{4C2301B4-FBD5-8988-ABD1-9C104DF0CD0D}"/>
-              </a:ext>
-            </a:extLst>
-          </p:cNvPr>
-          <p:cNvPicPr>
-            <a:picLocks noChangeAspect="1"/>
-          </p:cNvPicPr>
-          <p:nvPr/>
-        </p:nvPicPr>
-        <p:blipFill>
-          <a:blip r:embed="rId2">
-            <a:extLst>
-              <a:ext uri="{28A0092B-C50C-407E-A947-70E740481C1C}">
-                <a14:useLocalDpi xmlns:a14="http://schemas.microsoft.com/office/drawing/2010/main" val="0"/>
-              </a:ext>
-            </a:extLst>
-          </a:blip>
-          <a:stretch>
-            <a:fillRect/>
-          </a:stretch>
-        </p:blipFill>
-        <p:spPr>
-          <a:xfrm>
-            <a:off x="5620797" y="3448449"/>
-            <a:ext cx="3420869" cy="3111288"/>
-          </a:xfrm>
-          <a:prstGeom prst="rect">
-            <a:avLst/>
-          </a:prstGeom>
-        </p:spPr>
-      </p:pic>
-      <p:pic>
-        <p:nvPicPr>
-          <p:cNvPr id="44" name="תמונה 43" descr="תמונה שמכילה טקסט, צילום מסך, עלילה, תרשים&#10;&#10;התיאור נוצר באופן אוטומטי">
-            <a:extLst>
-              <a:ext uri="{FF2B5EF4-FFF2-40B4-BE49-F238E27FC236}">
-                <a16:creationId xmlns:a16="http://schemas.microsoft.com/office/drawing/2014/main" id="{82F30DF8-27C5-F7E2-D450-9381CF398C22}"/>
-              </a:ext>
-            </a:extLst>
-          </p:cNvPr>
-          <p:cNvPicPr>
-            <a:picLocks noChangeAspect="1"/>
-          </p:cNvPicPr>
-          <p:nvPr/>
-        </p:nvPicPr>
-        <p:blipFill rotWithShape="1">
-          <a:blip r:embed="rId3">
-            <a:extLst>
-              <a:ext uri="{28A0092B-C50C-407E-A947-70E740481C1C}">
-                <a14:useLocalDpi xmlns:a14="http://schemas.microsoft.com/office/drawing/2010/main" val="0"/>
-              </a:ext>
-            </a:extLst>
-          </a:blip>
-          <a:srcRect l="2641" t="3940" r="8165" b="-1228"/>
-          <a:stretch/>
-        </p:blipFill>
-        <p:spPr>
-          <a:xfrm>
-            <a:off x="9527920" y="4898006"/>
-            <a:ext cx="2395959" cy="1959994"/>
-          </a:xfrm>
-          <a:prstGeom prst="rect">
-            <a:avLst/>
-          </a:prstGeom>
-        </p:spPr>
-      </p:pic>
-      <p:pic>
-        <p:nvPicPr>
-          <p:cNvPr id="47" name="תמונה 46" descr="תמונה שמכילה טקסט, צילום מסך, קו, מקביל&#10;&#10;התיאור נוצר באופן אוטומטי">
-            <a:extLst>
-              <a:ext uri="{FF2B5EF4-FFF2-40B4-BE49-F238E27FC236}">
-                <a16:creationId xmlns:a16="http://schemas.microsoft.com/office/drawing/2014/main" id="{0B19A2C6-DB44-231A-BCEA-DB6E62C9753F}"/>
-              </a:ext>
-            </a:extLst>
-          </p:cNvPr>
-          <p:cNvPicPr>
-            <a:picLocks noChangeAspect="1"/>
-          </p:cNvPicPr>
-          <p:nvPr/>
-        </p:nvPicPr>
-        <p:blipFill rotWithShape="1">
-          <a:blip r:embed="rId4">
-            <a:extLst>
-              <a:ext uri="{28A0092B-C50C-407E-A947-70E740481C1C}">
-                <a14:useLocalDpi xmlns:a14="http://schemas.microsoft.com/office/drawing/2010/main" val="0"/>
-              </a:ext>
-            </a:extLst>
-          </a:blip>
-          <a:srcRect l="3136" t="5279" r="6533" b="1678"/>
-          <a:stretch/>
-        </p:blipFill>
-        <p:spPr>
-          <a:xfrm>
-            <a:off x="9048926" y="2470236"/>
-            <a:ext cx="3127029" cy="2415693"/>
-          </a:xfrm>
-          <a:prstGeom prst="rect">
-            <a:avLst/>
-          </a:prstGeom>
-        </p:spPr>
-      </p:pic>
-      <p:pic>
-        <p:nvPicPr>
-          <p:cNvPr id="49" name="תמונה 48" descr="תמונה שמכילה טקסט, צילום מסך, ריבוע, מלבן&#10;&#10;התיאור נוצר באופן אוטומטי">
-            <a:extLst>
-              <a:ext uri="{FF2B5EF4-FFF2-40B4-BE49-F238E27FC236}">
-                <a16:creationId xmlns:a16="http://schemas.microsoft.com/office/drawing/2014/main" id="{3A6D1D7C-5EF2-FA35-9065-6A8DCDFE1C6B}"/>
-              </a:ext>
-            </a:extLst>
-          </p:cNvPr>
-          <p:cNvPicPr>
-            <a:picLocks noChangeAspect="1"/>
-          </p:cNvPicPr>
-          <p:nvPr/>
-        </p:nvPicPr>
-        <p:blipFill rotWithShape="1">
-          <a:blip r:embed="rId5">
-            <a:extLst>
-              <a:ext uri="{28A0092B-C50C-407E-A947-70E740481C1C}">
-                <a14:useLocalDpi xmlns:a14="http://schemas.microsoft.com/office/drawing/2010/main" val="0"/>
-              </a:ext>
-            </a:extLst>
-          </a:blip>
-          <a:srcRect l="6751" t="14797" r="13386" b="9568"/>
-          <a:stretch/>
-        </p:blipFill>
-        <p:spPr>
-          <a:xfrm>
-            <a:off x="5781618" y="477743"/>
-            <a:ext cx="3026886" cy="2866622"/>
-          </a:xfrm>
-          <a:prstGeom prst="rect">
-            <a:avLst/>
-          </a:prstGeom>
-        </p:spPr>
-      </p:pic>
-      <p:pic>
-        <p:nvPicPr>
-          <p:cNvPr id="51" name="תמונה 50" descr="תמונה שמכילה טקסט, צילום מסך, קו, מקביל&#10;&#10;התיאור נוצר באופן אוטומטי">
-            <a:extLst>
-              <a:ext uri="{FF2B5EF4-FFF2-40B4-BE49-F238E27FC236}">
-                <a16:creationId xmlns:a16="http://schemas.microsoft.com/office/drawing/2014/main" id="{0DF276CF-02D8-6FFD-DF09-7A1FC715FA59}"/>
-              </a:ext>
-            </a:extLst>
-          </p:cNvPr>
-          <p:cNvPicPr>
-            <a:picLocks noChangeAspect="1"/>
-          </p:cNvPicPr>
-          <p:nvPr/>
-        </p:nvPicPr>
-        <p:blipFill rotWithShape="1">
-          <a:blip r:embed="rId6">
-            <a:extLst>
-              <a:ext uri="{28A0092B-C50C-407E-A947-70E740481C1C}">
-                <a14:useLocalDpi xmlns:a14="http://schemas.microsoft.com/office/drawing/2010/main" val="0"/>
-              </a:ext>
-            </a:extLst>
-          </a:blip>
-          <a:srcRect l="2987" t="6184" r="7630" b="714"/>
-          <a:stretch/>
-        </p:blipFill>
-        <p:spPr>
-          <a:xfrm>
-            <a:off x="9039839" y="1551"/>
-            <a:ext cx="3126285" cy="2442309"/>
-          </a:xfrm>
-          <a:prstGeom prst="rect">
-            <a:avLst/>
-          </a:prstGeom>
-        </p:spPr>
-      </p:pic>
     </p:spTree>
     <p:extLst>
       <p:ext uri="{BB962C8B-B14F-4D97-AF65-F5344CB8AC3E}">

</xml_diff>